<commit_message>
update XLP whitepaper related document
</commit_message>
<xml_diff>
--- a/训练中心创客交叉融合空间建设/admin/UNESCO工程教育中心/XLP Whitepaper-Johari windows.pptx
+++ b/训练中心创客交叉融合空间建设/admin/UNESCO工程教育中心/XLP Whitepaper-Johari windows.pptx
@@ -6,8 +6,9 @@
   </p:sldMasterIdLst>
   <p:sldIdLst>
     <p:sldId id="256" r:id="rId2"/>
-    <p:sldId id="258" r:id="rId3"/>
-    <p:sldId id="257" r:id="rId4"/>
+    <p:sldId id="259" r:id="rId3"/>
+    <p:sldId id="258" r:id="rId4"/>
+    <p:sldId id="257" r:id="rId5"/>
   </p:sldIdLst>
   <p:sldSz cx="9144000" cy="6858000" type="screen4x3"/>
   <p:notesSz cx="6858000" cy="9144000"/>
@@ -4050,7 +4051,7 @@
           <p:nvPr>
             <p:extLst>
               <p:ext uri="{D42A27DB-BD31-4B8C-83A1-F6EECF244321}">
-                <p14:modId xmlns:p14="http://schemas.microsoft.com/office/powerpoint/2010/main" val="914898934"/>
+                <p14:modId xmlns:p14="http://schemas.microsoft.com/office/powerpoint/2010/main" val="722991597"/>
               </p:ext>
             </p:extLst>
           </p:nvPr>
@@ -4068,8 +4069,8 @@
               <a:tblGrid>
                 <a:gridCol w="823123"/>
                 <a:gridCol w="1044304"/>
-                <a:gridCol w="1789191"/>
-                <a:gridCol w="3543381"/>
+                <a:gridCol w="2666286"/>
+                <a:gridCol w="2666286"/>
               </a:tblGrid>
               <a:tr h="777448">
                 <a:tc>
@@ -4405,7 +4406,7 @@
                   </a:tcPr>
                 </a:tc>
               </a:tr>
-              <a:tr h="1346233">
+              <a:tr h="1922552">
                 <a:tc rowSpan="2">
                   <a:txBody>
                     <a:bodyPr/>
@@ -4549,6 +4550,23 @@
                           <a:cs typeface="Gill Sans"/>
                         </a:rPr>
                         <a:t> area</a:t>
+                      </a:r>
+                    </a:p>
+                    <a:p>
+                      <a:pPr algn="l"/>
+                      <a:endParaRPr lang="en-US" baseline="0" dirty="0" smtClean="0">
+                        <a:latin typeface="Gill Sans"/>
+                        <a:cs typeface="Gill Sans"/>
+                      </a:endParaRPr>
+                    </a:p>
+                    <a:p>
+                      <a:pPr algn="l"/>
+                      <a:r>
+                        <a:rPr lang="en-US" baseline="0" dirty="0" smtClean="0">
+                          <a:latin typeface="Gill Sans"/>
+                          <a:cs typeface="Gill Sans"/>
+                        </a:rPr>
+                        <a:t>Blogs, wiki, open tools</a:t>
                       </a:r>
                       <a:endParaRPr lang="en-US" dirty="0" smtClean="0">
                         <a:latin typeface="Gill Sans"/>
@@ -4620,6 +4638,23 @@
                         </a:rPr>
                         <a:t> area</a:t>
                       </a:r>
+                    </a:p>
+                    <a:p>
+                      <a:pPr algn="l"/>
+                      <a:endParaRPr lang="en-US" baseline="0" dirty="0" smtClean="0">
+                        <a:latin typeface="Gill Sans"/>
+                        <a:cs typeface="Gill Sans"/>
+                      </a:endParaRPr>
+                    </a:p>
+                    <a:p>
+                      <a:pPr algn="l"/>
+                      <a:r>
+                        <a:rPr lang="en-US" baseline="0" dirty="0" smtClean="0">
+                          <a:latin typeface="Gill Sans"/>
+                          <a:cs typeface="Gill Sans"/>
+                        </a:rPr>
+                        <a:t>Other’s comments</a:t>
+                      </a:r>
                       <a:endParaRPr lang="en-US" dirty="0">
                         <a:latin typeface="Gill Sans"/>
                         <a:cs typeface="Gill Sans"/>
@@ -4651,7 +4686,7 @@
                   </a:tcPr>
                 </a:tc>
               </a:tr>
-              <a:tr h="2498871">
+              <a:tr h="1922552">
                 <a:tc vMerge="1">
                   <a:txBody>
                     <a:bodyPr/>
@@ -4740,6 +4775,30 @@
                           <a:cs typeface="Gill Sans"/>
                         </a:rPr>
                         <a:t>Hidden area</a:t>
+                      </a:r>
+                    </a:p>
+                    <a:p>
+                      <a:pPr algn="l"/>
+                      <a:endParaRPr lang="en-US" dirty="0" smtClean="0">
+                        <a:latin typeface="Gill Sans"/>
+                        <a:cs typeface="Gill Sans"/>
+                      </a:endParaRPr>
+                    </a:p>
+                    <a:p>
+                      <a:pPr algn="l"/>
+                      <a:r>
+                        <a:rPr lang="en-US" dirty="0" smtClean="0">
+                          <a:latin typeface="Gill Sans"/>
+                          <a:cs typeface="Gill Sans"/>
+                        </a:rPr>
+                        <a:t>Private</a:t>
+                      </a:r>
+                      <a:r>
+                        <a:rPr lang="en-US" baseline="0" dirty="0" smtClean="0">
+                          <a:latin typeface="Gill Sans"/>
+                          <a:cs typeface="Gill Sans"/>
+                        </a:rPr>
+                        <a:t> intellectual assets</a:t>
                       </a:r>
                       <a:endParaRPr lang="en-US" dirty="0">
                         <a:latin typeface="Gill Sans"/>
@@ -4800,6 +4859,30 @@
                           <a:cs typeface="Gill Sans"/>
                         </a:rPr>
                         <a:t>Unknown area</a:t>
+                      </a:r>
+                    </a:p>
+                    <a:p>
+                      <a:pPr algn="l"/>
+                      <a:endParaRPr lang="en-US" dirty="0" smtClean="0">
+                        <a:latin typeface="Gill Sans"/>
+                        <a:cs typeface="Gill Sans"/>
+                      </a:endParaRPr>
+                    </a:p>
+                    <a:p>
+                      <a:pPr algn="l"/>
+                      <a:r>
+                        <a:rPr lang="en-US" dirty="0" smtClean="0">
+                          <a:latin typeface="Gill Sans"/>
+                          <a:cs typeface="Gill Sans"/>
+                        </a:rPr>
+                        <a:t>Untapped</a:t>
+                      </a:r>
+                      <a:r>
+                        <a:rPr lang="en-US" baseline="0" dirty="0" smtClean="0">
+                          <a:latin typeface="Gill Sans"/>
+                          <a:cs typeface="Gill Sans"/>
+                        </a:rPr>
+                        <a:t> potentials</a:t>
                       </a:r>
                       <a:endParaRPr lang="en-US" dirty="0">
                         <a:latin typeface="Gill Sans"/>
@@ -4876,6 +4959,868 @@
     </p:spTree>
     <p:extLst>
       <p:ext uri="{BB962C8B-B14F-4D97-AF65-F5344CB8AC3E}">
+        <p14:creationId xmlns:p14="http://schemas.microsoft.com/office/powerpoint/2010/main" val="3816522372"/>
+      </p:ext>
+    </p:extLst>
+  </p:cSld>
+  <p:clrMapOvr>
+    <a:masterClrMapping/>
+  </p:clrMapOvr>
+</p:sld>
+</file>
+
+<file path=ppt/slides/slide3.xml><?xml version="1.0" encoding="utf-8"?>
+<p:sld xmlns:a="http://schemas.openxmlformats.org/drawingml/2006/main" xmlns:r="http://schemas.openxmlformats.org/officeDocument/2006/relationships" xmlns:p="http://schemas.openxmlformats.org/presentationml/2006/main">
+  <p:cSld>
+    <p:spTree>
+      <p:nvGrpSpPr>
+        <p:cNvPr id="1" name=""/>
+        <p:cNvGrpSpPr/>
+        <p:nvPr/>
+      </p:nvGrpSpPr>
+      <p:grpSpPr>
+        <a:xfrm>
+          <a:off x="0" y="0"/>
+          <a:ext cx="0" cy="0"/>
+          <a:chOff x="0" y="0"/>
+          <a:chExt cx="0" cy="0"/>
+        </a:xfrm>
+      </p:grpSpPr>
+      <p:graphicFrame>
+        <p:nvGraphicFramePr>
+          <p:cNvPr id="8" name="Table 7"/>
+          <p:cNvGraphicFramePr>
+            <a:graphicFrameLocks noGrp="1"/>
+          </p:cNvGraphicFramePr>
+          <p:nvPr>
+            <p:extLst>
+              <p:ext uri="{D42A27DB-BD31-4B8C-83A1-F6EECF244321}">
+                <p14:modId xmlns:p14="http://schemas.microsoft.com/office/powerpoint/2010/main" val="914898934"/>
+              </p:ext>
+            </p:extLst>
+          </p:nvPr>
+        </p:nvGraphicFramePr>
+        <p:xfrm>
+          <a:off x="979715" y="628951"/>
+          <a:ext cx="7199999" cy="5400000"/>
+        </p:xfrm>
+        <a:graphic>
+          <a:graphicData uri="http://schemas.openxmlformats.org/drawingml/2006/table">
+            <a:tbl>
+              <a:tblPr firstRow="1" bandRow="1">
+                <a:tableStyleId>{5940675A-B579-460E-94D1-54222C63F5DA}</a:tableStyleId>
+              </a:tblPr>
+              <a:tblGrid>
+                <a:gridCol w="823123"/>
+                <a:gridCol w="1044304"/>
+                <a:gridCol w="1789191"/>
+                <a:gridCol w="3543381"/>
+              </a:tblGrid>
+              <a:tr h="777448">
+                <a:tc>
+                  <a:txBody>
+                    <a:bodyPr/>
+                    <a:lstStyle/>
+                    <a:p>
+                      <a:pPr algn="ctr"/>
+                      <a:endParaRPr lang="en-US" dirty="0">
+                        <a:latin typeface="Gill Sans"/>
+                        <a:cs typeface="Gill Sans"/>
+                      </a:endParaRPr>
+                    </a:p>
+                  </a:txBody>
+                  <a:tcPr anchor="ctr">
+                    <a:lnL w="12700" cmpd="sng">
+                      <a:noFill/>
+                    </a:lnL>
+                    <a:lnR w="12700" cmpd="sng">
+                      <a:noFill/>
+                    </a:lnR>
+                    <a:lnT w="12700" cmpd="sng">
+                      <a:noFill/>
+                    </a:lnT>
+                    <a:lnB w="12700" cmpd="sng">
+                      <a:noFill/>
+                    </a:lnB>
+                    <a:lnTlToBr w="12700" cmpd="sng">
+                      <a:noFill/>
+                      <a:prstDash val="solid"/>
+                    </a:lnTlToBr>
+                    <a:lnBlToTr w="12700" cmpd="sng">
+                      <a:noFill/>
+                      <a:prstDash val="solid"/>
+                    </a:lnBlToTr>
+                  </a:tcPr>
+                </a:tc>
+                <a:tc>
+                  <a:txBody>
+                    <a:bodyPr/>
+                    <a:lstStyle/>
+                    <a:p>
+                      <a:pPr algn="ctr"/>
+                      <a:endParaRPr lang="en-US" dirty="0">
+                        <a:latin typeface="Gill Sans"/>
+                        <a:cs typeface="Gill Sans"/>
+                      </a:endParaRPr>
+                    </a:p>
+                  </a:txBody>
+                  <a:tcPr anchor="ctr">
+                    <a:lnL w="12700" cmpd="sng">
+                      <a:noFill/>
+                    </a:lnL>
+                    <a:lnR w="38100" cap="flat" cmpd="sng" algn="ctr">
+                      <a:solidFill>
+                        <a:scrgbClr r="0" g="0" b="0"/>
+                      </a:solidFill>
+                      <a:prstDash val="solid"/>
+                      <a:round/>
+                      <a:headEnd type="none" w="med" len="med"/>
+                      <a:tailEnd type="none" w="med" len="med"/>
+                    </a:lnR>
+                    <a:lnT w="12700" cmpd="sng">
+                      <a:noFill/>
+                    </a:lnT>
+                    <a:lnB w="12700" cmpd="sng">
+                      <a:noFill/>
+                    </a:lnB>
+                    <a:lnTlToBr w="12700" cmpd="sng">
+                      <a:noFill/>
+                      <a:prstDash val="solid"/>
+                    </a:lnTlToBr>
+                    <a:lnBlToTr w="12700" cmpd="sng">
+                      <a:noFill/>
+                      <a:prstDash val="solid"/>
+                    </a:lnBlToTr>
+                  </a:tcPr>
+                </a:tc>
+                <a:tc gridSpan="2">
+                  <a:txBody>
+                    <a:bodyPr/>
+                    <a:lstStyle/>
+                    <a:p>
+                      <a:pPr algn="ctr"/>
+                      <a:r>
+                        <a:rPr lang="en-US" dirty="0" smtClean="0">
+                          <a:latin typeface="Gill Sans"/>
+                          <a:cs typeface="Gill Sans"/>
+                        </a:rPr>
+                        <a:t>Self</a:t>
+                      </a:r>
+                      <a:endParaRPr lang="en-US" dirty="0">
+                        <a:latin typeface="Gill Sans"/>
+                        <a:cs typeface="Gill Sans"/>
+                      </a:endParaRPr>
+                    </a:p>
+                  </a:txBody>
+                  <a:tcPr anchor="ctr">
+                    <a:lnL w="38100" cap="flat" cmpd="sng" algn="ctr">
+                      <a:solidFill>
+                        <a:scrgbClr r="0" g="0" b="0"/>
+                      </a:solidFill>
+                      <a:prstDash val="solid"/>
+                      <a:round/>
+                      <a:headEnd type="none" w="med" len="med"/>
+                      <a:tailEnd type="none" w="med" len="med"/>
+                    </a:lnL>
+                    <a:lnR w="38100" cap="flat" cmpd="sng" algn="ctr">
+                      <a:solidFill>
+                        <a:scrgbClr r="0" g="0" b="0"/>
+                      </a:solidFill>
+                      <a:prstDash val="solid"/>
+                      <a:round/>
+                      <a:headEnd type="none" w="med" len="med"/>
+                      <a:tailEnd type="none" w="med" len="med"/>
+                    </a:lnR>
+                    <a:lnT w="38100" cap="flat" cmpd="sng" algn="ctr">
+                      <a:solidFill>
+                        <a:scrgbClr r="0" g="0" b="0"/>
+                      </a:solidFill>
+                      <a:prstDash val="solid"/>
+                      <a:round/>
+                      <a:headEnd type="none" w="med" len="med"/>
+                      <a:tailEnd type="none" w="med" len="med"/>
+                    </a:lnT>
+                    <a:lnB w="12700" cap="flat" cmpd="sng" algn="ctr">
+                      <a:solidFill>
+                        <a:scrgbClr r="0" g="0" b="0"/>
+                      </a:solidFill>
+                      <a:prstDash val="dash"/>
+                      <a:round/>
+                      <a:headEnd type="none" w="med" len="med"/>
+                      <a:tailEnd type="none" w="med" len="med"/>
+                    </a:lnB>
+                  </a:tcPr>
+                </a:tc>
+                <a:tc hMerge="1">
+                  <a:txBody>
+                    <a:bodyPr/>
+                    <a:lstStyle/>
+                    <a:p>
+                      <a:endParaRPr lang="en-US" dirty="0"/>
+                    </a:p>
+                  </a:txBody>
+                  <a:tcPr/>
+                </a:tc>
+              </a:tr>
+              <a:tr h="777448">
+                <a:tc>
+                  <a:txBody>
+                    <a:bodyPr/>
+                    <a:lstStyle/>
+                    <a:p>
+                      <a:pPr algn="ctr"/>
+                      <a:endParaRPr lang="en-US" dirty="0">
+                        <a:latin typeface="Gill Sans"/>
+                        <a:cs typeface="Gill Sans"/>
+                      </a:endParaRPr>
+                    </a:p>
+                  </a:txBody>
+                  <a:tcPr anchor="ctr">
+                    <a:lnL w="12700" cmpd="sng">
+                      <a:noFill/>
+                    </a:lnL>
+                    <a:lnR w="12700" cmpd="sng">
+                      <a:noFill/>
+                    </a:lnR>
+                    <a:lnT w="12700" cmpd="sng">
+                      <a:noFill/>
+                    </a:lnT>
+                    <a:lnB w="38100" cap="flat" cmpd="sng" algn="ctr">
+                      <a:solidFill>
+                        <a:scrgbClr r="0" g="0" b="0"/>
+                      </a:solidFill>
+                      <a:prstDash val="solid"/>
+                      <a:round/>
+                      <a:headEnd type="none" w="med" len="med"/>
+                      <a:tailEnd type="none" w="med" len="med"/>
+                    </a:lnB>
+                    <a:lnTlToBr w="12700" cmpd="sng">
+                      <a:noFill/>
+                      <a:prstDash val="solid"/>
+                    </a:lnTlToBr>
+                    <a:lnBlToTr w="12700" cmpd="sng">
+                      <a:noFill/>
+                      <a:prstDash val="solid"/>
+                    </a:lnBlToTr>
+                  </a:tcPr>
+                </a:tc>
+                <a:tc>
+                  <a:txBody>
+                    <a:bodyPr/>
+                    <a:lstStyle/>
+                    <a:p>
+                      <a:pPr algn="ctr"/>
+                      <a:endParaRPr lang="en-US" dirty="0">
+                        <a:latin typeface="Gill Sans"/>
+                        <a:cs typeface="Gill Sans"/>
+                      </a:endParaRPr>
+                    </a:p>
+                  </a:txBody>
+                  <a:tcPr anchor="ctr">
+                    <a:lnL w="12700" cmpd="sng">
+                      <a:noFill/>
+                    </a:lnL>
+                    <a:lnR w="38100" cap="flat" cmpd="sng" algn="ctr">
+                      <a:solidFill>
+                        <a:scrgbClr r="0" g="0" b="0"/>
+                      </a:solidFill>
+                      <a:prstDash val="solid"/>
+                      <a:round/>
+                      <a:headEnd type="none" w="med" len="med"/>
+                      <a:tailEnd type="none" w="med" len="med"/>
+                    </a:lnR>
+                    <a:lnT w="12700" cmpd="sng">
+                      <a:noFill/>
+                    </a:lnT>
+                    <a:lnB w="38100" cap="flat" cmpd="sng" algn="ctr">
+                      <a:solidFill>
+                        <a:scrgbClr r="0" g="0" b="0"/>
+                      </a:solidFill>
+                      <a:prstDash val="solid"/>
+                      <a:round/>
+                      <a:headEnd type="none" w="med" len="med"/>
+                      <a:tailEnd type="none" w="med" len="med"/>
+                    </a:lnB>
+                    <a:lnTlToBr w="12700" cmpd="sng">
+                      <a:noFill/>
+                      <a:prstDash val="solid"/>
+                    </a:lnTlToBr>
+                    <a:lnBlToTr w="12700" cmpd="sng">
+                      <a:noFill/>
+                      <a:prstDash val="solid"/>
+                    </a:lnBlToTr>
+                  </a:tcPr>
+                </a:tc>
+                <a:tc>
+                  <a:txBody>
+                    <a:bodyPr/>
+                    <a:lstStyle/>
+                    <a:p>
+                      <a:pPr algn="ctr"/>
+                      <a:r>
+                        <a:rPr lang="en-US" i="1" dirty="0" smtClean="0">
+                          <a:latin typeface="Gill Sans"/>
+                          <a:cs typeface="Gill Sans"/>
+                        </a:rPr>
+                        <a:t>Known</a:t>
+                      </a:r>
+                      <a:endParaRPr lang="en-US" i="1" dirty="0">
+                        <a:latin typeface="Gill Sans"/>
+                        <a:cs typeface="Gill Sans"/>
+                      </a:endParaRPr>
+                    </a:p>
+                  </a:txBody>
+                  <a:tcPr anchor="ctr">
+                    <a:lnL w="38100" cap="flat" cmpd="sng" algn="ctr">
+                      <a:solidFill>
+                        <a:scrgbClr r="0" g="0" b="0"/>
+                      </a:solidFill>
+                      <a:prstDash val="solid"/>
+                      <a:round/>
+                      <a:headEnd type="none" w="med" len="med"/>
+                      <a:tailEnd type="none" w="med" len="med"/>
+                    </a:lnL>
+                    <a:lnT w="12700" cap="flat" cmpd="sng" algn="ctr">
+                      <a:solidFill>
+                        <a:scrgbClr r="0" g="0" b="0"/>
+                      </a:solidFill>
+                      <a:prstDash val="dash"/>
+                      <a:round/>
+                      <a:headEnd type="none" w="med" len="med"/>
+                      <a:tailEnd type="none" w="med" len="med"/>
+                    </a:lnT>
+                    <a:lnB w="38100" cap="flat" cmpd="sng" algn="ctr">
+                      <a:solidFill>
+                        <a:scrgbClr r="0" g="0" b="0"/>
+                      </a:solidFill>
+                      <a:prstDash val="solid"/>
+                      <a:round/>
+                      <a:headEnd type="none" w="med" len="med"/>
+                      <a:tailEnd type="none" w="med" len="med"/>
+                    </a:lnB>
+                  </a:tcPr>
+                </a:tc>
+                <a:tc>
+                  <a:txBody>
+                    <a:bodyPr/>
+                    <a:lstStyle/>
+                    <a:p>
+                      <a:pPr algn="ctr"/>
+                      <a:r>
+                        <a:rPr lang="en-US" i="1" dirty="0" smtClean="0">
+                          <a:latin typeface="Gill Sans"/>
+                          <a:cs typeface="Gill Sans"/>
+                        </a:rPr>
+                        <a:t>Unknown</a:t>
+                      </a:r>
+                      <a:endParaRPr lang="en-US" i="1" dirty="0">
+                        <a:latin typeface="Gill Sans"/>
+                        <a:cs typeface="Gill Sans"/>
+                      </a:endParaRPr>
+                    </a:p>
+                  </a:txBody>
+                  <a:tcPr anchor="ctr">
+                    <a:lnR w="38100" cap="flat" cmpd="sng" algn="ctr">
+                      <a:solidFill>
+                        <a:scrgbClr r="0" g="0" b="0"/>
+                      </a:solidFill>
+                      <a:prstDash val="solid"/>
+                      <a:round/>
+                      <a:headEnd type="none" w="med" len="med"/>
+                      <a:tailEnd type="none" w="med" len="med"/>
+                    </a:lnR>
+                    <a:lnT w="12700" cap="flat" cmpd="sng" algn="ctr">
+                      <a:solidFill>
+                        <a:scrgbClr r="0" g="0" b="0"/>
+                      </a:solidFill>
+                      <a:prstDash val="dash"/>
+                      <a:round/>
+                      <a:headEnd type="none" w="med" len="med"/>
+                      <a:tailEnd type="none" w="med" len="med"/>
+                    </a:lnT>
+                    <a:lnB w="38100" cap="flat" cmpd="sng" algn="ctr">
+                      <a:solidFill>
+                        <a:scrgbClr r="0" g="0" b="0"/>
+                      </a:solidFill>
+                      <a:prstDash val="solid"/>
+                      <a:round/>
+                      <a:headEnd type="none" w="med" len="med"/>
+                      <a:tailEnd type="none" w="med" len="med"/>
+                    </a:lnB>
+                  </a:tcPr>
+                </a:tc>
+              </a:tr>
+              <a:tr h="1346233">
+                <a:tc rowSpan="2">
+                  <a:txBody>
+                    <a:bodyPr/>
+                    <a:lstStyle/>
+                    <a:p>
+                      <a:pPr algn="ctr"/>
+                      <a:r>
+                        <a:rPr lang="en-US" dirty="0" smtClean="0">
+                          <a:latin typeface="Gill Sans"/>
+                          <a:cs typeface="Gill Sans"/>
+                        </a:rPr>
+                        <a:t>Others</a:t>
+                      </a:r>
+                      <a:endParaRPr lang="en-US" dirty="0">
+                        <a:latin typeface="Gill Sans"/>
+                        <a:cs typeface="Gill Sans"/>
+                      </a:endParaRPr>
+                    </a:p>
+                  </a:txBody>
+                  <a:tcPr anchor="ctr">
+                    <a:lnL w="38100" cap="flat" cmpd="sng" algn="ctr">
+                      <a:solidFill>
+                        <a:scrgbClr r="0" g="0" b="0"/>
+                      </a:solidFill>
+                      <a:prstDash val="solid"/>
+                      <a:round/>
+                      <a:headEnd type="none" w="med" len="med"/>
+                      <a:tailEnd type="none" w="med" len="med"/>
+                    </a:lnL>
+                    <a:lnR w="12700" cap="flat" cmpd="sng" algn="ctr">
+                      <a:solidFill>
+                        <a:scrgbClr r="0" g="0" b="0"/>
+                      </a:solidFill>
+                      <a:prstDash val="dash"/>
+                      <a:round/>
+                      <a:headEnd type="none" w="med" len="med"/>
+                      <a:tailEnd type="none" w="med" len="med"/>
+                    </a:lnR>
+                    <a:lnT w="38100" cap="flat" cmpd="sng" algn="ctr">
+                      <a:solidFill>
+                        <a:scrgbClr r="0" g="0" b="0"/>
+                      </a:solidFill>
+                      <a:prstDash val="solid"/>
+                      <a:round/>
+                      <a:headEnd type="none" w="med" len="med"/>
+                      <a:tailEnd type="none" w="med" len="med"/>
+                    </a:lnT>
+                    <a:lnB w="38100" cap="flat" cmpd="sng" algn="ctr">
+                      <a:solidFill>
+                        <a:scrgbClr r="0" g="0" b="0"/>
+                      </a:solidFill>
+                      <a:prstDash val="solid"/>
+                      <a:round/>
+                      <a:headEnd type="none" w="med" len="med"/>
+                      <a:tailEnd type="none" w="med" len="med"/>
+                    </a:lnB>
+                  </a:tcPr>
+                </a:tc>
+                <a:tc>
+                  <a:txBody>
+                    <a:bodyPr/>
+                    <a:lstStyle/>
+                    <a:p>
+                      <a:pPr algn="ctr"/>
+                      <a:r>
+                        <a:rPr lang="en-US" i="1" dirty="0" smtClean="0">
+                          <a:latin typeface="Gill Sans"/>
+                          <a:cs typeface="Gill Sans"/>
+                        </a:rPr>
+                        <a:t>Known</a:t>
+                      </a:r>
+                      <a:endParaRPr lang="en-US" i="1" dirty="0">
+                        <a:latin typeface="Gill Sans"/>
+                        <a:cs typeface="Gill Sans"/>
+                      </a:endParaRPr>
+                    </a:p>
+                  </a:txBody>
+                  <a:tcPr anchor="ctr">
+                    <a:lnL w="12700" cap="flat" cmpd="sng" algn="ctr">
+                      <a:solidFill>
+                        <a:scrgbClr r="0" g="0" b="0"/>
+                      </a:solidFill>
+                      <a:prstDash val="dash"/>
+                      <a:round/>
+                      <a:headEnd type="none" w="med" len="med"/>
+                      <a:tailEnd type="none" w="med" len="med"/>
+                    </a:lnL>
+                    <a:lnR w="38100" cap="flat" cmpd="sng" algn="ctr">
+                      <a:solidFill>
+                        <a:scrgbClr r="0" g="0" b="0"/>
+                      </a:solidFill>
+                      <a:prstDash val="solid"/>
+                      <a:round/>
+                      <a:headEnd type="none" w="med" len="med"/>
+                      <a:tailEnd type="none" w="med" len="med"/>
+                    </a:lnR>
+                    <a:lnT w="38100" cap="flat" cmpd="sng" algn="ctr">
+                      <a:solidFill>
+                        <a:scrgbClr r="0" g="0" b="0"/>
+                      </a:solidFill>
+                      <a:prstDash val="solid"/>
+                      <a:round/>
+                      <a:headEnd type="none" w="med" len="med"/>
+                      <a:tailEnd type="none" w="med" len="med"/>
+                    </a:lnT>
+                  </a:tcPr>
+                </a:tc>
+                <a:tc>
+                  <a:txBody>
+                    <a:bodyPr/>
+                    <a:lstStyle/>
+                    <a:p>
+                      <a:pPr algn="l"/>
+                      <a:r>
+                        <a:rPr lang="en-US" dirty="0" smtClean="0">
+                          <a:latin typeface="Gill Sans"/>
+                          <a:cs typeface="Gill Sans"/>
+                        </a:rPr>
+                        <a:t>1</a:t>
+                      </a:r>
+                    </a:p>
+                    <a:p>
+                      <a:pPr algn="l"/>
+                      <a:endParaRPr lang="en-US" dirty="0" smtClean="0">
+                        <a:latin typeface="Gill Sans"/>
+                        <a:cs typeface="Gill Sans"/>
+                      </a:endParaRPr>
+                    </a:p>
+                    <a:p>
+                      <a:pPr algn="l"/>
+                      <a:r>
+                        <a:rPr lang="en-US" dirty="0" smtClean="0">
+                          <a:latin typeface="Gill Sans"/>
+                          <a:cs typeface="Gill Sans"/>
+                        </a:rPr>
+                        <a:t>Open</a:t>
+                      </a:r>
+                      <a:r>
+                        <a:rPr lang="en-US" baseline="0" dirty="0" smtClean="0">
+                          <a:latin typeface="Gill Sans"/>
+                          <a:cs typeface="Gill Sans"/>
+                        </a:rPr>
+                        <a:t> area</a:t>
+                      </a:r>
+                      <a:endParaRPr lang="en-US" dirty="0" smtClean="0">
+                        <a:latin typeface="Gill Sans"/>
+                        <a:cs typeface="Gill Sans"/>
+                      </a:endParaRPr>
+                    </a:p>
+                  </a:txBody>
+                  <a:tcPr>
+                    <a:lnL w="38100" cap="flat" cmpd="sng" algn="ctr">
+                      <a:solidFill>
+                        <a:scrgbClr r="0" g="0" b="0"/>
+                      </a:solidFill>
+                      <a:prstDash val="solid"/>
+                      <a:round/>
+                      <a:headEnd type="none" w="med" len="med"/>
+                      <a:tailEnd type="none" w="med" len="med"/>
+                    </a:lnL>
+                    <a:lnT w="38100" cap="flat" cmpd="sng" algn="ctr">
+                      <a:solidFill>
+                        <a:scrgbClr r="0" g="0" b="0"/>
+                      </a:solidFill>
+                      <a:prstDash val="solid"/>
+                      <a:round/>
+                      <a:headEnd type="none" w="med" len="med"/>
+                      <a:tailEnd type="none" w="med" len="med"/>
+                    </a:lnT>
+                    <a:solidFill>
+                      <a:schemeClr val="accent3">
+                        <a:lumMod val="60000"/>
+                        <a:lumOff val="40000"/>
+                      </a:schemeClr>
+                    </a:solidFill>
+                  </a:tcPr>
+                </a:tc>
+                <a:tc>
+                  <a:txBody>
+                    <a:bodyPr/>
+                    <a:lstStyle/>
+                    <a:p>
+                      <a:pPr algn="r"/>
+                      <a:r>
+                        <a:rPr lang="en-US" dirty="0" smtClean="0">
+                          <a:latin typeface="Gill Sans"/>
+                          <a:cs typeface="Gill Sans"/>
+                        </a:rPr>
+                        <a:t>2</a:t>
+                      </a:r>
+                    </a:p>
+                    <a:p>
+                      <a:pPr algn="l"/>
+                      <a:endParaRPr lang="en-US" dirty="0" smtClean="0">
+                        <a:latin typeface="Gill Sans"/>
+                        <a:cs typeface="Gill Sans"/>
+                      </a:endParaRPr>
+                    </a:p>
+                    <a:p>
+                      <a:pPr algn="l"/>
+                      <a:r>
+                        <a:rPr lang="en-US" dirty="0" smtClean="0">
+                          <a:latin typeface="Gill Sans"/>
+                          <a:cs typeface="Gill Sans"/>
+                        </a:rPr>
+                        <a:t>Blind</a:t>
+                      </a:r>
+                      <a:r>
+                        <a:rPr lang="en-US" baseline="0" dirty="0" smtClean="0">
+                          <a:latin typeface="Gill Sans"/>
+                          <a:cs typeface="Gill Sans"/>
+                        </a:rPr>
+                        <a:t> area</a:t>
+                      </a:r>
+                      <a:endParaRPr lang="en-US" dirty="0">
+                        <a:latin typeface="Gill Sans"/>
+                        <a:cs typeface="Gill Sans"/>
+                      </a:endParaRPr>
+                    </a:p>
+                  </a:txBody>
+                  <a:tcPr>
+                    <a:lnR w="38100" cap="flat" cmpd="sng" algn="ctr">
+                      <a:solidFill>
+                        <a:scrgbClr r="0" g="0" b="0"/>
+                      </a:solidFill>
+                      <a:prstDash val="solid"/>
+                      <a:round/>
+                      <a:headEnd type="none" w="med" len="med"/>
+                      <a:tailEnd type="none" w="med" len="med"/>
+                    </a:lnR>
+                    <a:lnT w="38100" cap="flat" cmpd="sng" algn="ctr">
+                      <a:solidFill>
+                        <a:scrgbClr r="0" g="0" b="0"/>
+                      </a:solidFill>
+                      <a:prstDash val="solid"/>
+                      <a:round/>
+                      <a:headEnd type="none" w="med" len="med"/>
+                      <a:tailEnd type="none" w="med" len="med"/>
+                    </a:lnT>
+                    <a:solidFill>
+                      <a:srgbClr val="FF6666"/>
+                    </a:solidFill>
+                  </a:tcPr>
+                </a:tc>
+              </a:tr>
+              <a:tr h="2498871">
+                <a:tc vMerge="1">
+                  <a:txBody>
+                    <a:bodyPr/>
+                    <a:lstStyle/>
+                    <a:p>
+                      <a:endParaRPr lang="en-US" dirty="0"/>
+                    </a:p>
+                  </a:txBody>
+                  <a:tcPr/>
+                </a:tc>
+                <a:tc>
+                  <a:txBody>
+                    <a:bodyPr/>
+                    <a:lstStyle/>
+                    <a:p>
+                      <a:pPr algn="ctr"/>
+                      <a:r>
+                        <a:rPr lang="en-US" i="1" dirty="0" smtClean="0">
+                          <a:latin typeface="Gill Sans"/>
+                          <a:cs typeface="Gill Sans"/>
+                        </a:rPr>
+                        <a:t>Unknown</a:t>
+                      </a:r>
+                      <a:endParaRPr lang="en-US" i="1" dirty="0">
+                        <a:latin typeface="Gill Sans"/>
+                        <a:cs typeface="Gill Sans"/>
+                      </a:endParaRPr>
+                    </a:p>
+                  </a:txBody>
+                  <a:tcPr anchor="ctr">
+                    <a:lnL w="12700" cap="flat" cmpd="sng" algn="ctr">
+                      <a:solidFill>
+                        <a:scrgbClr r="0" g="0" b="0"/>
+                      </a:solidFill>
+                      <a:prstDash val="dash"/>
+                      <a:round/>
+                      <a:headEnd type="none" w="med" len="med"/>
+                      <a:tailEnd type="none" w="med" len="med"/>
+                    </a:lnL>
+                    <a:lnR w="38100" cap="flat" cmpd="sng" algn="ctr">
+                      <a:solidFill>
+                        <a:scrgbClr r="0" g="0" b="0"/>
+                      </a:solidFill>
+                      <a:prstDash val="solid"/>
+                      <a:round/>
+                      <a:headEnd type="none" w="med" len="med"/>
+                      <a:tailEnd type="none" w="med" len="med"/>
+                    </a:lnR>
+                    <a:lnB w="38100" cap="flat" cmpd="sng" algn="ctr">
+                      <a:solidFill>
+                        <a:scrgbClr r="0" g="0" b="0"/>
+                      </a:solidFill>
+                      <a:prstDash val="solid"/>
+                      <a:round/>
+                      <a:headEnd type="none" w="med" len="med"/>
+                      <a:tailEnd type="none" w="med" len="med"/>
+                    </a:lnB>
+                  </a:tcPr>
+                </a:tc>
+                <a:tc>
+                  <a:txBody>
+                    <a:bodyPr/>
+                    <a:lstStyle/>
+                    <a:p>
+                      <a:pPr algn="l"/>
+                      <a:r>
+                        <a:rPr lang="en-US" dirty="0" smtClean="0">
+                          <a:latin typeface="Gill Sans"/>
+                          <a:cs typeface="Gill Sans"/>
+                        </a:rPr>
+                        <a:t>3</a:t>
+                      </a:r>
+                    </a:p>
+                    <a:p>
+                      <a:pPr algn="l"/>
+                      <a:endParaRPr lang="en-US" dirty="0" smtClean="0">
+                        <a:latin typeface="Gill Sans"/>
+                        <a:cs typeface="Gill Sans"/>
+                      </a:endParaRPr>
+                    </a:p>
+                    <a:p>
+                      <a:pPr algn="l"/>
+                      <a:r>
+                        <a:rPr lang="en-US" dirty="0" smtClean="0">
+                          <a:latin typeface="Gill Sans"/>
+                          <a:cs typeface="Gill Sans"/>
+                        </a:rPr>
+                        <a:t>Hidden area</a:t>
+                      </a:r>
+                      <a:endParaRPr lang="en-US" dirty="0">
+                        <a:latin typeface="Gill Sans"/>
+                        <a:cs typeface="Gill Sans"/>
+                      </a:endParaRPr>
+                    </a:p>
+                  </a:txBody>
+                  <a:tcPr>
+                    <a:lnL w="38100" cap="flat" cmpd="sng" algn="ctr">
+                      <a:solidFill>
+                        <a:scrgbClr r="0" g="0" b="0"/>
+                      </a:solidFill>
+                      <a:prstDash val="solid"/>
+                      <a:round/>
+                      <a:headEnd type="none" w="med" len="med"/>
+                      <a:tailEnd type="none" w="med" len="med"/>
+                    </a:lnL>
+                    <a:lnB w="38100" cap="flat" cmpd="sng" algn="ctr">
+                      <a:solidFill>
+                        <a:scrgbClr r="0" g="0" b="0"/>
+                      </a:solidFill>
+                      <a:prstDash val="solid"/>
+                      <a:round/>
+                      <a:headEnd type="none" w="med" len="med"/>
+                      <a:tailEnd type="none" w="med" len="med"/>
+                    </a:lnB>
+                    <a:solidFill>
+                      <a:srgbClr val="FF6666"/>
+                    </a:solidFill>
+                  </a:tcPr>
+                </a:tc>
+                <a:tc>
+                  <a:txBody>
+                    <a:bodyPr/>
+                    <a:lstStyle/>
+                    <a:p>
+                      <a:pPr algn="r"/>
+                      <a:r>
+                        <a:rPr lang="en-US" dirty="0" smtClean="0">
+                          <a:latin typeface="Gill Sans"/>
+                          <a:cs typeface="Gill Sans"/>
+                        </a:rPr>
+                        <a:t>4</a:t>
+                      </a:r>
+                    </a:p>
+                    <a:p>
+                      <a:pPr algn="l"/>
+                      <a:endParaRPr lang="en-US" dirty="0" smtClean="0">
+                        <a:latin typeface="Gill Sans"/>
+                        <a:cs typeface="Gill Sans"/>
+                      </a:endParaRPr>
+                    </a:p>
+                    <a:p>
+                      <a:pPr algn="l"/>
+                      <a:r>
+                        <a:rPr lang="en-US" dirty="0" smtClean="0">
+                          <a:latin typeface="Gill Sans"/>
+                          <a:cs typeface="Gill Sans"/>
+                        </a:rPr>
+                        <a:t>Unknown area</a:t>
+                      </a:r>
+                      <a:endParaRPr lang="en-US" dirty="0">
+                        <a:latin typeface="Gill Sans"/>
+                        <a:cs typeface="Gill Sans"/>
+                      </a:endParaRPr>
+                    </a:p>
+                  </a:txBody>
+                  <a:tcPr>
+                    <a:lnR w="38100" cap="flat" cmpd="sng" algn="ctr">
+                      <a:solidFill>
+                        <a:scrgbClr r="0" g="0" b="0"/>
+                      </a:solidFill>
+                      <a:prstDash val="solid"/>
+                      <a:round/>
+                      <a:headEnd type="none" w="med" len="med"/>
+                      <a:tailEnd type="none" w="med" len="med"/>
+                    </a:lnR>
+                    <a:lnB w="38100" cap="flat" cmpd="sng" algn="ctr">
+                      <a:solidFill>
+                        <a:scrgbClr r="0" g="0" b="0"/>
+                      </a:solidFill>
+                      <a:prstDash val="solid"/>
+                      <a:round/>
+                      <a:headEnd type="none" w="med" len="med"/>
+                      <a:tailEnd type="none" w="med" len="med"/>
+                    </a:lnB>
+                    <a:solidFill>
+                      <a:srgbClr val="FF0000"/>
+                    </a:solidFill>
+                  </a:tcPr>
+                </a:tc>
+              </a:tr>
+            </a:tbl>
+          </a:graphicData>
+        </a:graphic>
+      </p:graphicFrame>
+      <p:sp>
+        <p:nvSpPr>
+          <p:cNvPr id="9" name="TextBox 8"/>
+          <p:cNvSpPr txBox="1"/>
+          <p:nvPr/>
+        </p:nvSpPr>
+        <p:spPr>
+          <a:xfrm>
+            <a:off x="3426174" y="6295143"/>
+            <a:ext cx="2300630" cy="369332"/>
+          </a:xfrm>
+          <a:prstGeom prst="rect">
+            <a:avLst/>
+          </a:prstGeom>
+          <a:noFill/>
+        </p:spPr>
+        <p:txBody>
+          <a:bodyPr wrap="none" rtlCol="0">
+            <a:spAutoFit/>
+          </a:bodyPr>
+          <a:lstStyle/>
+          <a:p>
+            <a:pPr algn="ctr"/>
+            <a:r>
+              <a:rPr lang="en-US" dirty="0" smtClean="0">
+                <a:latin typeface="Gill Sans"/>
+                <a:cs typeface="Gill Sans"/>
+              </a:rPr>
+              <a:t>Less developed worlds</a:t>
+            </a:r>
+            <a:endParaRPr lang="en-US" dirty="0">
+              <a:latin typeface="Gill Sans"/>
+              <a:cs typeface="Gill Sans"/>
+            </a:endParaRPr>
+          </a:p>
+        </p:txBody>
+      </p:sp>
+    </p:spTree>
+    <p:extLst>
+      <p:ext uri="{BB962C8B-B14F-4D97-AF65-F5344CB8AC3E}">
         <p14:creationId xmlns:p14="http://schemas.microsoft.com/office/powerpoint/2010/main" val="3833451289"/>
       </p:ext>
     </p:extLst>
@@ -4886,7 +5831,7 @@
 </p:sld>
 </file>
 
-<file path=ppt/slides/slide3.xml><?xml version="1.0" encoding="utf-8"?>
+<file path=ppt/slides/slide4.xml><?xml version="1.0" encoding="utf-8"?>
 <p:sld xmlns:a="http://schemas.openxmlformats.org/drawingml/2006/main" xmlns:r="http://schemas.openxmlformats.org/officeDocument/2006/relationships" xmlns:p="http://schemas.openxmlformats.org/presentationml/2006/main">
   <p:cSld>
     <p:spTree>

</xml_diff>